<commit_message>
Small changes applied to the 3rd presentation
</commit_message>
<xml_diff>
--- a/Presentations/Python Tutorial Series - Packages and Virtual Envs.pptx
+++ b/Presentations/Python Tutorial Series - Packages and Virtual Envs.pptx
@@ -9831,8 +9831,8 @@
         </p:nvSpPr>
         <p:spPr>
           <a:xfrm>
-            <a:off x="3124200" y="6519863"/>
-            <a:ext cx="2895600" cy="365125"/>
+            <a:off x="2506551" y="6519863"/>
+            <a:ext cx="4130898" cy="365125"/>
           </a:xfrm>
           <a:prstGeom prst="rect">
             <a:avLst/>
@@ -27763,6 +27763,13 @@
   <p:transition>
     <p:fade/>
   </p:transition>
+  <p:timing>
+    <p:tnLst>
+      <p:par>
+        <p:cTn id="1" dur="indefinite" restart="never" nodeType="tmRoot"/>
+      </p:par>
+    </p:tnLst>
+  </p:timing>
 </p:sld>
 </file>
 
@@ -28446,6 +28453,13 @@
   <p:transition>
     <p:fade/>
   </p:transition>
+  <p:timing>
+    <p:tnLst>
+      <p:par>
+        <p:cTn id="1" dur="indefinite" restart="never" nodeType="tmRoot"/>
+      </p:par>
+    </p:tnLst>
+  </p:timing>
 </p:sld>
 </file>
 
@@ -29296,6 +29310,13 @@
   <p:transition>
     <p:fade/>
   </p:transition>
+  <p:timing>
+    <p:tnLst>
+      <p:par>
+        <p:cTn id="1" dur="indefinite" restart="never" nodeType="tmRoot"/>
+      </p:par>
+    </p:tnLst>
+  </p:timing>
 </p:sld>
 </file>
 
@@ -29788,6 +29809,13 @@
   <p:transition>
     <p:fade/>
   </p:transition>
+  <p:timing>
+    <p:tnLst>
+      <p:par>
+        <p:cTn id="1" dur="indefinite" restart="never" nodeType="tmRoot"/>
+      </p:par>
+    </p:tnLst>
+  </p:timing>
 </p:sld>
 </file>
 
@@ -30471,6 +30499,13 @@
   <p:transition>
     <p:fade/>
   </p:transition>
+  <p:timing>
+    <p:tnLst>
+      <p:par>
+        <p:cTn id="1" dur="indefinite" restart="never" nodeType="tmRoot"/>
+      </p:par>
+    </p:tnLst>
+  </p:timing>
 </p:sld>
 </file>
 
@@ -31346,6 +31381,13 @@
   <p:transition>
     <p:fade/>
   </p:transition>
+  <p:timing>
+    <p:tnLst>
+      <p:par>
+        <p:cTn id="1" dur="indefinite" restart="never" nodeType="tmRoot"/>
+      </p:par>
+    </p:tnLst>
+  </p:timing>
 </p:sld>
 </file>
 
@@ -31936,14 +31978,31 @@
               <a:defRPr/>
             </a:pPr>
             <a:r>
+              <a:rPr lang="es-ES" dirty="0" err="1">
+                <a:solidFill>
+                  <a:srgbClr val="000000"/>
+                </a:solidFill>
+                <a:latin typeface="Lato" pitchFamily="34" charset="0"/>
+              </a:rPr>
+              <a:t>Channels</a:t>
+            </a:r>
+            <a:r>
+              <a:rPr lang="es-ES" dirty="0">
+                <a:solidFill>
+                  <a:srgbClr val="000000"/>
+                </a:solidFill>
+                <a:latin typeface="Lato" pitchFamily="34" charset="0"/>
+              </a:rPr>
+              <a:t> and </a:t>
+            </a:r>
+            <a:r>
               <a:rPr lang="es-ES" dirty="0" err="1" smtClean="0">
                 <a:solidFill>
                   <a:srgbClr val="000000"/>
                 </a:solidFill>
                 <a:latin typeface="Lato" pitchFamily="34" charset="0"/>
-                <a:ea typeface="+mn-ea"/>
-              </a:rPr>
-              <a:t>Astroconda</a:t>
+              </a:rPr>
+              <a:t>packages</a:t>
             </a:r>
             <a:endParaRPr lang="es-ES" dirty="0" smtClean="0">
               <a:solidFill>
@@ -31970,27 +32029,7 @@
                 <a:latin typeface="Lato" pitchFamily="34" charset="0"/>
                 <a:ea typeface="+mn-ea"/>
               </a:rPr>
-              <a:t>Channels</a:t>
-            </a:r>
-            <a:r>
-              <a:rPr lang="es-ES" dirty="0" smtClean="0">
-                <a:solidFill>
-                  <a:srgbClr val="000000"/>
-                </a:solidFill>
-                <a:latin typeface="Lato" pitchFamily="34" charset="0"/>
-                <a:ea typeface="+mn-ea"/>
-              </a:rPr>
-              <a:t> and </a:t>
-            </a:r>
-            <a:r>
-              <a:rPr lang="es-ES" dirty="0" err="1" smtClean="0">
-                <a:solidFill>
-                  <a:srgbClr val="000000"/>
-                </a:solidFill>
-                <a:latin typeface="Lato" pitchFamily="34" charset="0"/>
-                <a:ea typeface="+mn-ea"/>
-              </a:rPr>
-              <a:t>packages</a:t>
+              <a:t>Astroconda</a:t>
             </a:r>
             <a:endParaRPr lang="es-ES" dirty="0" smtClean="0">
               <a:solidFill>
@@ -33414,6 +33453,13 @@
   <p:transition>
     <p:fade/>
   </p:transition>
+  <p:timing>
+    <p:tnLst>
+      <p:par>
+        <p:cTn id="1" dur="indefinite" restart="never" nodeType="tmRoot"/>
+      </p:par>
+    </p:tnLst>
+  </p:timing>
 </p:sld>
 </file>
 
@@ -33917,6 +33963,13 @@
   <p:transition>
     <p:fade/>
   </p:transition>
+  <p:timing>
+    <p:tnLst>
+      <p:par>
+        <p:cTn id="1" dur="indefinite" restart="never" nodeType="tmRoot"/>
+      </p:par>
+    </p:tnLst>
+  </p:timing>
 </p:sld>
 </file>
 
@@ -34544,6 +34597,13 @@
   <p:transition>
     <p:fade/>
   </p:transition>
+  <p:timing>
+    <p:tnLst>
+      <p:par>
+        <p:cTn id="1" dur="indefinite" restart="never" nodeType="tmRoot"/>
+      </p:par>
+    </p:tnLst>
+  </p:timing>
 </p:sld>
 </file>
 
@@ -35566,6 +35626,13 @@
   <p:transition>
     <p:fade/>
   </p:transition>
+  <p:timing>
+    <p:tnLst>
+      <p:par>
+        <p:cTn id="1" dur="indefinite" restart="never" nodeType="tmRoot"/>
+      </p:par>
+    </p:tnLst>
+  </p:timing>
 </p:sld>
 </file>
 
@@ -36027,6 +36094,13 @@
   <p:transition>
     <p:fade/>
   </p:transition>
+  <p:timing>
+    <p:tnLst>
+      <p:par>
+        <p:cTn id="1" dur="indefinite" restart="never" nodeType="tmRoot"/>
+      </p:par>
+    </p:tnLst>
+  </p:timing>
 </p:sld>
 </file>
 
@@ -36581,6 +36655,13 @@
   <p:transition>
     <p:fade/>
   </p:transition>
+  <p:timing>
+    <p:tnLst>
+      <p:par>
+        <p:cTn id="1" dur="indefinite" restart="never" nodeType="tmRoot"/>
+      </p:par>
+    </p:tnLst>
+  </p:timing>
 </p:sld>
 </file>
 
@@ -37261,6 +37342,13 @@
   <p:transition>
     <p:fade/>
   </p:transition>
+  <p:timing>
+    <p:tnLst>
+      <p:par>
+        <p:cTn id="1" dur="indefinite" restart="never" nodeType="tmRoot"/>
+      </p:par>
+    </p:tnLst>
+  </p:timing>
 </p:sld>
 </file>
 
@@ -38170,6 +38258,13 @@
   <p:transition>
     <p:fade/>
   </p:transition>
+  <p:timing>
+    <p:tnLst>
+      <p:par>
+        <p:cTn id="1" dur="indefinite" restart="never" nodeType="tmRoot"/>
+      </p:par>
+    </p:tnLst>
+  </p:timing>
 </p:sld>
 </file>
 
@@ -39095,6 +39190,13 @@
   <p:transition>
     <p:fade/>
   </p:transition>
+  <p:timing>
+    <p:tnLst>
+      <p:par>
+        <p:cTn id="1" dur="indefinite" restart="never" nodeType="tmRoot"/>
+      </p:par>
+    </p:tnLst>
+  </p:timing>
 </p:sld>
 </file>
 
@@ -39564,6 +39666,13 @@
   <p:transition>
     <p:fade/>
   </p:transition>
+  <p:timing>
+    <p:tnLst>
+      <p:par>
+        <p:cTn id="1" dur="indefinite" restart="never" nodeType="tmRoot"/>
+      </p:par>
+    </p:tnLst>
+  </p:timing>
 </p:sld>
 </file>
 
@@ -40883,6 +40992,13 @@
   <p:transition>
     <p:fade/>
   </p:transition>
+  <p:timing>
+    <p:tnLst>
+      <p:par>
+        <p:cTn id="1" dur="indefinite" restart="never" nodeType="tmRoot"/>
+      </p:par>
+    </p:tnLst>
+  </p:timing>
 </p:sld>
 </file>
 
@@ -41803,6 +41919,13 @@
   <p:transition>
     <p:fade/>
   </p:transition>
+  <p:timing>
+    <p:tnLst>
+      <p:par>
+        <p:cTn id="1" dur="indefinite" restart="never" nodeType="tmRoot"/>
+      </p:par>
+    </p:tnLst>
+  </p:timing>
 </p:sld>
 </file>
 
@@ -42662,6 +42785,13 @@
   <p:transition>
     <p:fade/>
   </p:transition>
+  <p:timing>
+    <p:tnLst>
+      <p:par>
+        <p:cTn id="1" dur="indefinite" restart="never" nodeType="tmRoot"/>
+      </p:par>
+    </p:tnLst>
+  </p:timing>
 </p:sld>
 </file>
 
@@ -42974,30 +43104,128 @@
           </p:txBody>
         </p:sp>
       </p:grpSp>
+      <p:sp>
+        <p:nvSpPr>
+          <p:cNvPr id="19" name="TextBox 18"/>
+          <p:cNvSpPr txBox="1"/>
+          <p:nvPr/>
+        </p:nvSpPr>
+        <p:spPr>
+          <a:xfrm>
+            <a:off x="5557762" y="6103066"/>
+            <a:ext cx="3586238" cy="307777"/>
+          </a:xfrm>
+          <a:prstGeom prst="rect">
+            <a:avLst/>
+          </a:prstGeom>
+          <a:noFill/>
+        </p:spPr>
+        <p:txBody>
+          <a:bodyPr wrap="none" rtlCol="0">
+            <a:spAutoFit/>
+          </a:bodyPr>
+          <a:lstStyle/>
+          <a:p>
+            <a:r>
+              <a:rPr lang="en-US" sz="1400" dirty="0" smtClean="0"/>
+              <a:t>See more on </a:t>
+            </a:r>
+            <a:r>
+              <a:rPr lang="en-US" sz="1400" dirty="0" smtClean="0">
+                <a:hlinkClick r:id="rId2"/>
+              </a:rPr>
+              <a:t>Conda: Command Reference</a:t>
+            </a:r>
+            <a:endParaRPr lang="en-US" sz="1400" dirty="0"/>
+          </a:p>
+        </p:txBody>
+      </p:sp>
+      <p:sp>
+        <p:nvSpPr>
+          <p:cNvPr id="20" name="Rectangle 19"/>
+          <p:cNvSpPr/>
+          <p:nvPr/>
+        </p:nvSpPr>
+        <p:spPr>
+          <a:xfrm>
+            <a:off x="163864" y="3775296"/>
+            <a:ext cx="8522936" cy="369332"/>
+          </a:xfrm>
+          <a:prstGeom prst="rect">
+            <a:avLst/>
+          </a:prstGeom>
+        </p:spPr>
+        <p:txBody>
+          <a:bodyPr wrap="square">
+            <a:spAutoFit/>
+          </a:bodyPr>
+          <a:lstStyle/>
+          <a:p>
+            <a:r>
+              <a:rPr lang="en-US" dirty="0" smtClean="0">
+                <a:latin typeface="Consolas" charset="0"/>
+                <a:ea typeface="Consolas" charset="0"/>
+                <a:cs typeface="Consolas" charset="0"/>
+              </a:rPr>
+              <a:t>$ </a:t>
+            </a:r>
+            <a:r>
+              <a:rPr lang="en-US" dirty="0" err="1" smtClean="0">
+                <a:latin typeface="Consolas" charset="0"/>
+                <a:ea typeface="Consolas" charset="0"/>
+                <a:cs typeface="Consolas" charset="0"/>
+              </a:rPr>
+              <a:t>conda</a:t>
+            </a:r>
+            <a:r>
+              <a:rPr lang="en-US" dirty="0" smtClean="0">
+                <a:latin typeface="Consolas" charset="0"/>
+                <a:ea typeface="Consolas" charset="0"/>
+                <a:cs typeface="Consolas" charset="0"/>
+              </a:rPr>
+              <a:t> install </a:t>
+            </a:r>
+            <a:r>
+              <a:rPr lang="en-US" dirty="0" err="1" smtClean="0">
+                <a:latin typeface="Consolas" charset="0"/>
+                <a:ea typeface="Consolas" charset="0"/>
+                <a:cs typeface="Consolas" charset="0"/>
+              </a:rPr>
+              <a:t>numpy</a:t>
+            </a:r>
+            <a:endParaRPr lang="en-US" dirty="0">
+              <a:effectLst/>
+              <a:latin typeface="Consolas" charset="0"/>
+              <a:ea typeface="Consolas" charset="0"/>
+              <a:cs typeface="Consolas" charset="0"/>
+            </a:endParaRPr>
+          </a:p>
+        </p:txBody>
+      </p:sp>
       <p:grpSp>
         <p:nvGrpSpPr>
-          <p:cNvPr id="10" name="Group 9"/>
+          <p:cNvPr id="21" name="Group 20"/>
           <p:cNvGrpSpPr/>
           <p:nvPr/>
         </p:nvGrpSpPr>
         <p:grpSpPr>
           <a:xfrm>
             <a:off x="173850" y="2689137"/>
-            <a:ext cx="4110118" cy="987957"/>
+            <a:ext cx="5118230" cy="987957"/>
             <a:chOff x="168188" y="1700808"/>
-            <a:chExt cx="4110118" cy="987957"/>
+            <a:chExt cx="6054334" cy="987957"/>
           </a:xfrm>
         </p:grpSpPr>
         <p:sp>
           <p:nvSpPr>
-            <p:cNvPr id="11" name="Rectangle 10"/>
+            <p:cNvPr id="22" name="Rectangle 21"/>
             <p:cNvSpPr/>
             <p:nvPr/>
           </p:nvSpPr>
           <p:spPr>
             <a:xfrm>
               <a:off x="179512" y="2204864"/>
-              <a:ext cx="4098794" cy="483901"/>
+              <a:ext cx="6043010" cy="483901"/>
             </a:xfrm>
             <a:prstGeom prst="rect">
               <a:avLst/>
@@ -43045,7 +43273,7 @@
                 <a:t>$ </a:t>
               </a:r>
               <a:r>
-                <a:rPr lang="en-US" dirty="0" err="1" smtClean="0">
+                <a:rPr lang="en-US" dirty="0" err="1">
                   <a:solidFill>
                     <a:srgbClr val="0070C0"/>
                   </a:solidFill>
@@ -43056,7 +43284,7 @@
                 <a:t>conda</a:t>
               </a:r>
               <a:r>
-                <a:rPr lang="en-US" dirty="0" smtClean="0">
+                <a:rPr lang="en-US" dirty="0">
                   <a:solidFill>
                     <a:srgbClr val="0070C0"/>
                   </a:solidFill>
@@ -43067,7 +43295,7 @@
                 <a:t> install</a:t>
               </a:r>
               <a:r>
-                <a:rPr lang="en-US" dirty="0" smtClean="0">
+                <a:rPr lang="en-US" dirty="0">
                   <a:solidFill>
                     <a:schemeClr val="tx1"/>
                   </a:solidFill>
@@ -43078,7 +43306,7 @@
                 <a:t> </a:t>
               </a:r>
               <a:r>
-                <a:rPr lang="en-US" dirty="0" err="1" smtClean="0">
+                <a:rPr lang="en-US" dirty="0" err="1">
                   <a:solidFill>
                     <a:schemeClr val="tx1"/>
                   </a:solidFill>
@@ -43101,7 +43329,7 @@
         </p:sp>
         <p:sp>
           <p:nvSpPr>
-            <p:cNvPr id="12" name="TextBox 11"/>
+            <p:cNvPr id="23" name="TextBox 22"/>
             <p:cNvSpPr txBox="1"/>
             <p:nvPr/>
           </p:nvSpPr>
@@ -43137,104 +43365,6 @@
           </p:txBody>
         </p:sp>
       </p:grpSp>
-      <p:sp>
-        <p:nvSpPr>
-          <p:cNvPr id="19" name="TextBox 18"/>
-          <p:cNvSpPr txBox="1"/>
-          <p:nvPr/>
-        </p:nvSpPr>
-        <p:spPr>
-          <a:xfrm>
-            <a:off x="5557762" y="6103066"/>
-            <a:ext cx="3586238" cy="307777"/>
-          </a:xfrm>
-          <a:prstGeom prst="rect">
-            <a:avLst/>
-          </a:prstGeom>
-          <a:noFill/>
-        </p:spPr>
-        <p:txBody>
-          <a:bodyPr wrap="none" rtlCol="0">
-            <a:spAutoFit/>
-          </a:bodyPr>
-          <a:lstStyle/>
-          <a:p>
-            <a:r>
-              <a:rPr lang="en-US" sz="1400" dirty="0" smtClean="0"/>
-              <a:t>See more on </a:t>
-            </a:r>
-            <a:r>
-              <a:rPr lang="en-US" sz="1400" dirty="0" smtClean="0">
-                <a:hlinkClick r:id="rId2"/>
-              </a:rPr>
-              <a:t>Conda: Command Reference</a:t>
-            </a:r>
-            <a:endParaRPr lang="en-US" sz="1400" dirty="0"/>
-          </a:p>
-        </p:txBody>
-      </p:sp>
-      <p:sp>
-        <p:nvSpPr>
-          <p:cNvPr id="20" name="Rectangle 19"/>
-          <p:cNvSpPr/>
-          <p:nvPr/>
-        </p:nvSpPr>
-        <p:spPr>
-          <a:xfrm>
-            <a:off x="163864" y="3775296"/>
-            <a:ext cx="8522936" cy="369332"/>
-          </a:xfrm>
-          <a:prstGeom prst="rect">
-            <a:avLst/>
-          </a:prstGeom>
-        </p:spPr>
-        <p:txBody>
-          <a:bodyPr wrap="square">
-            <a:spAutoFit/>
-          </a:bodyPr>
-          <a:lstStyle/>
-          <a:p>
-            <a:r>
-              <a:rPr lang="en-US" dirty="0" smtClean="0">
-                <a:latin typeface="Consolas" charset="0"/>
-                <a:ea typeface="Consolas" charset="0"/>
-                <a:cs typeface="Consolas" charset="0"/>
-              </a:rPr>
-              <a:t>$ </a:t>
-            </a:r>
-            <a:r>
-              <a:rPr lang="en-US" dirty="0" err="1" smtClean="0">
-                <a:latin typeface="Consolas" charset="0"/>
-                <a:ea typeface="Consolas" charset="0"/>
-                <a:cs typeface="Consolas" charset="0"/>
-              </a:rPr>
-              <a:t>conda</a:t>
-            </a:r>
-            <a:r>
-              <a:rPr lang="en-US" dirty="0" smtClean="0">
-                <a:latin typeface="Consolas" charset="0"/>
-                <a:ea typeface="Consolas" charset="0"/>
-                <a:cs typeface="Consolas" charset="0"/>
-              </a:rPr>
-              <a:t> install </a:t>
-            </a:r>
-            <a:r>
-              <a:rPr lang="en-US" dirty="0" err="1" smtClean="0">
-                <a:latin typeface="Consolas" charset="0"/>
-                <a:ea typeface="Consolas" charset="0"/>
-                <a:cs typeface="Consolas" charset="0"/>
-              </a:rPr>
-              <a:t>numpy</a:t>
-            </a:r>
-            <a:endParaRPr lang="en-US" dirty="0">
-              <a:effectLst/>
-              <a:latin typeface="Consolas" charset="0"/>
-              <a:ea typeface="Consolas" charset="0"/>
-              <a:cs typeface="Consolas" charset="0"/>
-            </a:endParaRPr>
-          </a:p>
-        </p:txBody>
-      </p:sp>
     </p:spTree>
     <p:extLst>
       <p:ext uri="{BB962C8B-B14F-4D97-AF65-F5344CB8AC3E}">
@@ -43248,6 +43378,13 @@
   <p:transition>
     <p:fade/>
   </p:transition>
+  <p:timing>
+    <p:tnLst>
+      <p:par>
+        <p:cTn id="1" dur="indefinite" restart="never" nodeType="tmRoot"/>
+      </p:par>
+    </p:tnLst>
+  </p:timing>
 </p:sld>
 </file>
 
@@ -43837,6 +43974,13 @@
   <p:transition>
     <p:fade/>
   </p:transition>
+  <p:timing>
+    <p:tnLst>
+      <p:par>
+        <p:cTn id="1" dur="indefinite" restart="never" nodeType="tmRoot"/>
+      </p:par>
+    </p:tnLst>
+  </p:timing>
 </p:sld>
 </file>
 
@@ -44465,6 +44609,13 @@
   <p:transition>
     <p:fade/>
   </p:transition>
+  <p:timing>
+    <p:tnLst>
+      <p:par>
+        <p:cTn id="1" dur="indefinite" restart="never" nodeType="tmRoot"/>
+      </p:par>
+    </p:tnLst>
+  </p:timing>
 </p:sld>
 </file>
 
@@ -45149,6 +45300,13 @@
   <p:transition>
     <p:fade/>
   </p:transition>
+  <p:timing>
+    <p:tnLst>
+      <p:par>
+        <p:cTn id="1" dur="indefinite" restart="never" nodeType="tmRoot"/>
+      </p:par>
+    </p:tnLst>
+  </p:timing>
 </p:sld>
 </file>
 
@@ -46143,6 +46301,13 @@
   <p:transition>
     <p:fade/>
   </p:transition>
+  <p:timing>
+    <p:tnLst>
+      <p:par>
+        <p:cTn id="1" dur="indefinite" restart="never" nodeType="tmRoot"/>
+      </p:par>
+    </p:tnLst>
+  </p:timing>
 </p:sld>
 </file>
 
@@ -46829,6 +46994,13 @@
   <p:transition>
     <p:fade/>
   </p:transition>
+  <p:timing>
+    <p:tnLst>
+      <p:par>
+        <p:cTn id="1" dur="indefinite" restart="never" nodeType="tmRoot"/>
+      </p:par>
+    </p:tnLst>
+  </p:timing>
 </p:sld>
 </file>
 
@@ -47515,6 +47687,13 @@
   <p:transition>
     <p:fade/>
   </p:transition>
+  <p:timing>
+    <p:tnLst>
+      <p:par>
+        <p:cTn id="1" dur="indefinite" restart="never" nodeType="tmRoot"/>
+      </p:par>
+    </p:tnLst>
+  </p:timing>
 </p:sld>
 </file>
 
@@ -49346,6 +49525,13 @@
   <p:transition>
     <p:fade/>
   </p:transition>
+  <p:timing>
+    <p:tnLst>
+      <p:par>
+        <p:cTn id="1" dur="indefinite" restart="never" nodeType="tmRoot"/>
+      </p:par>
+    </p:tnLst>
+  </p:timing>
 </p:sld>
 </file>
 

</xml_diff>